<commit_message>
betulkan inspection plan powerpoint
</commit_message>
<xml_diff>
--- a/Inspection Plan Powerpoint Template.pptx
+++ b/Inspection Plan Powerpoint Template.pptx
@@ -271,7 +271,7 @@
       </p15:notesGuideLst>
     </p:ext>
     <p:ext uri="GoogleSlidesCustomDataVersion2">
-      <go:slidesCustomData xmlns="" xmlns:mc="http://schemas.openxmlformats.org/markup-compatibility/2006" xmlns:mv="urn:schemas-microsoft-com:mac:vml" xmlns:c="http://schemas.openxmlformats.org/drawingml/2006/chart" xmlns:dgm="http://schemas.openxmlformats.org/drawingml/2006/diagram" xmlns:o="urn:schemas-microsoft-com:office:office" xmlns:v="urn:schemas-microsoft-com:vml" xmlns:pvml="urn:schemas-microsoft-com:office:powerpoint" xmlns:com="http://schemas.openxmlformats.org/drawingml/2006/compatibility" xmlns:p14="http://schemas.microsoft.com/office/powerpoint/2010/main" xmlns:p15="http://schemas.microsoft.com/office/powerpoint/2012/main" xmlns:ahyp="http://schemas.microsoft.com/office/drawing/2018/hyperlinkcolor" xmlns:go="http://customooxmlschemas.google.com/" r:id="rId17" roundtripDataSignature="AMtx7mi63UC9Eo4fSiesXjw4TJcT6QamgA=="/>
+      <go:slidesCustomData xmlns:go="http://customooxmlschemas.google.com/" xmlns:ahyp="http://schemas.microsoft.com/office/drawing/2018/hyperlinkcolor" xmlns:p15="http://schemas.microsoft.com/office/powerpoint/2012/main" xmlns:p14="http://schemas.microsoft.com/office/powerpoint/2010/main" xmlns:com="http://schemas.openxmlformats.org/drawingml/2006/compatibility" xmlns:pvml="urn:schemas-microsoft-com:office:powerpoint" xmlns:v="urn:schemas-microsoft-com:vml" xmlns:o="urn:schemas-microsoft-com:office:office" xmlns:dgm="http://schemas.openxmlformats.org/drawingml/2006/diagram" xmlns:c="http://schemas.openxmlformats.org/drawingml/2006/chart" xmlns:mv="urn:schemas-microsoft-com:mac:vml" xmlns:mc="http://schemas.openxmlformats.org/markup-compatibility/2006" xmlns="" r:id="rId17" roundtripDataSignature="AMtx7mi63UC9Eo4fSiesXjw4TJcT6QamgA=="/>
     </p:ext>
   </p:extLst>
 </p:presentation>
@@ -7395,33 +7395,6 @@
           </a:graphicData>
         </a:graphic>
       </p:graphicFrame>
-      <p:pic>
-        <p:nvPicPr>
-          <p:cNvPr id="52" name="Google Shape;52;p1"/>
-          <p:cNvPicPr preferRelativeResize="0"/>
-          <p:nvPr/>
-        </p:nvPicPr>
-        <p:blipFill rotWithShape="1">
-          <a:blip r:embed="rId3">
-            <a:alphaModFix/>
-          </a:blip>
-          <a:srcRect/>
-          <a:stretch/>
-        </p:blipFill>
-        <p:spPr>
-          <a:xfrm rot="5400000">
-            <a:off x="5337629" y="3010527"/>
-            <a:ext cx="3800793" cy="2863043"/>
-          </a:xfrm>
-          <a:prstGeom prst="rect">
-            <a:avLst/>
-          </a:prstGeom>
-          <a:noFill/>
-          <a:ln>
-            <a:noFill/>
-          </a:ln>
-        </p:spPr>
-      </p:pic>
       <p:graphicFrame>
         <p:nvGraphicFramePr>
           <p:cNvPr id="53" name="Google Shape;53;p1"/>

</xml_diff>

<commit_message>
Fix Jinja2 template error, improve row numbering logic, and add email loading state
</commit_message>
<xml_diff>
--- a/Inspection Plan Powerpoint Template.pptx
+++ b/Inspection Plan Powerpoint Template.pptx
@@ -271,7 +271,7 @@
       </p15:notesGuideLst>
     </p:ext>
     <p:ext uri="GoogleSlidesCustomDataVersion2">
-      <go:slidesCustomData xmlns:go="http://customooxmlschemas.google.com/" xmlns:ahyp="http://schemas.microsoft.com/office/drawing/2018/hyperlinkcolor" xmlns:p15="http://schemas.microsoft.com/office/powerpoint/2012/main" xmlns:p14="http://schemas.microsoft.com/office/powerpoint/2010/main" xmlns:com="http://schemas.openxmlformats.org/drawingml/2006/compatibility" xmlns:pvml="urn:schemas-microsoft-com:office:powerpoint" xmlns:v="urn:schemas-microsoft-com:vml" xmlns:o="urn:schemas-microsoft-com:office:office" xmlns:dgm="http://schemas.openxmlformats.org/drawingml/2006/diagram" xmlns:c="http://schemas.openxmlformats.org/drawingml/2006/chart" xmlns:mv="urn:schemas-microsoft-com:mac:vml" xmlns:mc="http://schemas.openxmlformats.org/markup-compatibility/2006" xmlns="" r:id="rId17" roundtripDataSignature="AMtx7mi63UC9Eo4fSiesXjw4TJcT6QamgA=="/>
+      <go:slidesCustomData xmlns="" xmlns:mc="http://schemas.openxmlformats.org/markup-compatibility/2006" xmlns:mv="urn:schemas-microsoft-com:mac:vml" xmlns:c="http://schemas.openxmlformats.org/drawingml/2006/chart" xmlns:dgm="http://schemas.openxmlformats.org/drawingml/2006/diagram" xmlns:o="urn:schemas-microsoft-com:office:office" xmlns:v="urn:schemas-microsoft-com:vml" xmlns:pvml="urn:schemas-microsoft-com:office:powerpoint" xmlns:com="http://schemas.openxmlformats.org/drawingml/2006/compatibility" xmlns:p14="http://schemas.microsoft.com/office/powerpoint/2010/main" xmlns:p15="http://schemas.microsoft.com/office/powerpoint/2012/main" xmlns:ahyp="http://schemas.microsoft.com/office/drawing/2018/hyperlinkcolor" xmlns:go="http://customooxmlschemas.google.com/" r:id="rId17" roundtripDataSignature="AMtx7mi63UC9Eo4fSiesXjw4TJcT6QamgA=="/>
     </p:ext>
   </p:extLst>
 </p:presentation>
@@ -7399,10 +7399,16 @@
         <p:nvGraphicFramePr>
           <p:cNvPr id="53" name="Google Shape;53;p1"/>
           <p:cNvGraphicFramePr/>
-          <p:nvPr/>
+          <p:nvPr>
+            <p:extLst>
+              <p:ext uri="{D42A27DB-BD31-4B8C-83A1-F6EECF244321}">
+                <p14:modId xmlns:p14="http://schemas.microsoft.com/office/powerpoint/2010/main" val="3781841529"/>
+              </p:ext>
+            </p:extLst>
+          </p:nvPr>
         </p:nvGraphicFramePr>
         <p:xfrm>
-          <a:off x="475862" y="3004348"/>
+          <a:off x="475862" y="3882889"/>
           <a:ext cx="4477150" cy="2463680"/>
         </p:xfrm>
         <a:graphic>
@@ -7530,7 +7536,7 @@
                         <a:buNone/>
                       </a:pPr>
                       <a:r>
-                        <a:rPr lang="en-MY" sz="800" b="0">
+                        <a:rPr lang="en-MY" sz="800" b="0" dirty="0">
                           <a:solidFill>
                             <a:schemeClr val="dk1"/>
                           </a:solidFill>
@@ -7541,7 +7547,7 @@
                         </a:rPr>
                         <a:t>INSPECTION COVERAGE</a:t>
                       </a:r>
-                      <a:endParaRPr sz="800" b="0">
+                      <a:endParaRPr sz="800" b="0" dirty="0">
                         <a:solidFill>
                           <a:schemeClr val="dk1"/>
                         </a:solidFill>
@@ -8187,7 +8193,7 @@
                         <a:buNone/>
                       </a:pPr>
                       <a:r>
-                        <a:rPr lang="en-MY" sz="800" u="none">
+                        <a:rPr lang="en-MY" sz="800" u="none" dirty="0">
                           <a:solidFill>
                             <a:schemeClr val="dk1"/>
                           </a:solidFill>
@@ -8198,7 +8204,7 @@
                         </a:rPr>
                         <a:t>Atmospheric Corrosion</a:t>
                       </a:r>
-                      <a:endParaRPr sz="800" u="none">
+                      <a:endParaRPr sz="800" u="none" dirty="0">
                         <a:solidFill>
                           <a:schemeClr val="dk1"/>
                         </a:solidFill>
@@ -8226,7 +8232,7 @@
                         <a:buFont typeface="Arial"/>
                         <a:buNone/>
                       </a:pPr>
-                      <a:endParaRPr sz="800" b="0">
+                      <a:endParaRPr sz="800" b="0" dirty="0">
                         <a:latin typeface="Arial"/>
                         <a:ea typeface="Arial"/>
                         <a:cs typeface="Arial"/>

</xml_diff>